<commit_message>
fixed new slide names
</commit_message>
<xml_diff>
--- a/slides/WSTA_L12_question_answering.pptx
+++ b/slides/WSTA_L12_question_answering.pptx
@@ -897,7 +897,7 @@
           </a:ln>
           <a:extLst>
             <a:ext uri="{C572A759-6A51-4108-AA02-DFA0A04FC94B}">
-              <ma14:wrappingTextBoxFlag xmlns="" xmlns:ma14="http://schemas.microsoft.com/office/mac/drawingml/2011/main" val="1"/>
+              <ma14:wrappingTextBoxFlag xmlns:ma14="http://schemas.microsoft.com/office/mac/drawingml/2011/main" xmlns="" val="1"/>
             </a:ext>
           </a:extLst>
         </p:spPr>
@@ -2575,7 +2575,7 @@
           </a:ln>
           <a:extLst>
             <a:ext uri="{C572A759-6A51-4108-AA02-DFA0A04FC94B}">
-              <ma14:wrappingTextBoxFlag xmlns="" xmlns:ma14="http://schemas.microsoft.com/office/mac/drawingml/2011/main" val="1"/>
+              <ma14:wrappingTextBoxFlag xmlns:ma14="http://schemas.microsoft.com/office/mac/drawingml/2011/main" xmlns="" val="1"/>
             </a:ext>
           </a:extLst>
         </p:spPr>
@@ -2615,7 +2615,7 @@
           </a:ln>
           <a:extLst>
             <a:ext uri="{C572A759-6A51-4108-AA02-DFA0A04FC94B}">
-              <ma14:wrappingTextBoxFlag xmlns="" xmlns:ma14="http://schemas.microsoft.com/office/mac/drawingml/2011/main" val="1"/>
+              <ma14:wrappingTextBoxFlag xmlns:ma14="http://schemas.microsoft.com/office/mac/drawingml/2011/main" xmlns="" val="1"/>
             </a:ext>
           </a:extLst>
         </p:spPr>
@@ -5625,13 +5625,8 @@
           <a:p>
             <a:r>
               <a:rPr lang="en-AU" dirty="0" smtClean="0"/>
-              <a:t>Count of query </a:t>
-            </a:r>
-            <a:r>
-              <a:rPr lang="en-AU" dirty="0" smtClean="0"/>
-              <a:t>words in document</a:t>
-            </a:r>
-            <a:endParaRPr lang="en-AU" dirty="0" smtClean="0"/>
+              <a:t>Count of query words in document</a:t>
+            </a:r>
           </a:p>
           <a:p>
             <a:r>
@@ -5747,28 +5742,15 @@
             </a:r>
             <a:r>
               <a:rPr lang="en-AU" smtClean="0"/>
-              <a:t>in </a:t>
-            </a:r>
-            <a:r>
-              <a:rPr lang="en-AU" smtClean="0"/>
-              <a:t>retrieved</a:t>
-            </a:r>
-            <a:r>
-              <a:rPr lang="en-AU" smtClean="0"/>
-              <a:t> passage(s)</a:t>
+              <a:t>in retrieved passage(s)</a:t>
             </a:r>
             <a:endParaRPr lang="en-AU" dirty="0" smtClean="0"/>
           </a:p>
           <a:p>
             <a:r>
               <a:rPr lang="en-AU" dirty="0" smtClean="0"/>
-              <a:t>But sometimes multiple </a:t>
-            </a:r>
-            <a:r>
-              <a:rPr lang="en-AU" dirty="0" smtClean="0"/>
-              <a:t>entities</a:t>
-            </a:r>
-            <a:endParaRPr lang="en-AU" dirty="0" smtClean="0"/>
+              <a:t>But sometimes multiple entities</a:t>
+            </a:r>
           </a:p>
           <a:p>
             <a:r>
@@ -9814,15 +9796,7 @@
                   <a:srgbClr val="FF0000"/>
                 </a:solidFill>
               </a:rPr>
-              <a:t>be a founder </a:t>
-            </a:r>
-            <a:r>
-              <a:rPr lang="en-AU" i="1" dirty="0" smtClean="0">
-                <a:solidFill>
-                  <a:srgbClr val="FF0000"/>
-                </a:solidFill>
-              </a:rPr>
-              <a:t>of</a:t>
+              <a:t>be a founder of</a:t>
             </a:r>
             <a:r>
               <a:rPr lang="en-AU" i="1" dirty="0" smtClean="0">

</xml_diff>